<commit_message>
brief update to graphical outline
</commit_message>
<xml_diff>
--- a/Workflow5/wf5_graphical_outline.pptx
+++ b/Workflow5/wf5_graphical_outline.pptx
@@ -3490,7 +3490,7 @@
             </a:r>
             <a:r>
               <a:rPr lang="en-US" sz="1400" dirty="0"/>
-              <a:t>(using N X N, feature_association2?)</a:t>
+              <a:t>(using N X N, feature_association2? Possibly using /features endpoint…)</a:t>
             </a:r>
           </a:p>
           <a:p>
@@ -3912,8 +3912,8 @@
         </p:nvSpPr>
         <p:spPr>
           <a:xfrm>
-            <a:off x="600044" y="2480346"/>
-            <a:ext cx="5597913" cy="3285893"/>
+            <a:off x="1929384" y="1602522"/>
+            <a:ext cx="7999325" cy="3285893"/>
           </a:xfrm>
           <a:prstGeom prst="roundRect">
             <a:avLst/>
@@ -3949,7 +3949,7 @@
                   <a:schemeClr val="bg1"/>
                 </a:solidFill>
               </a:rPr>
-              <a:t>Module 4: New Tools/Analysis? (possibly Gamma?) </a:t>
+              <a:t>Module 4: New Tools/Analysis? (possibly Gamma is capable of this already?) </a:t>
             </a:r>
           </a:p>
           <a:p>
@@ -3970,310 +3970,6 @@
                 <a:schemeClr val="bg1"/>
               </a:solidFill>
             </a:endParaRPr>
-          </a:p>
-        </p:txBody>
-      </p:sp>
-      <p:cxnSp>
-        <p:nvCxnSpPr>
-          <p:cNvPr id="4" name="Straight Arrow Connector 3">
-            <a:extLst>
-              <a:ext uri="{FF2B5EF4-FFF2-40B4-BE49-F238E27FC236}">
-                <a16:creationId xmlns:a16="http://schemas.microsoft.com/office/drawing/2014/main" id="{E5E1C2A7-864E-0F4E-A827-11F1848BD2D1}"/>
-              </a:ext>
-            </a:extLst>
-          </p:cNvPr>
-          <p:cNvCxnSpPr>
-            <a:cxnSpLocks/>
-          </p:cNvCxnSpPr>
-          <p:nvPr/>
-        </p:nvCxnSpPr>
-        <p:spPr>
-          <a:xfrm>
-            <a:off x="699439" y="237947"/>
-            <a:ext cx="1111554" cy="2054872"/>
-          </a:xfrm>
-          <a:prstGeom prst="straightConnector1">
-            <a:avLst/>
-          </a:prstGeom>
-          <a:ln w="38100">
-            <a:tailEnd type="triangle"/>
-          </a:ln>
-        </p:spPr>
-        <p:style>
-          <a:lnRef idx="1">
-            <a:schemeClr val="accent1"/>
-          </a:lnRef>
-          <a:fillRef idx="0">
-            <a:schemeClr val="accent1"/>
-          </a:fillRef>
-          <a:effectRef idx="0">
-            <a:schemeClr val="accent1"/>
-          </a:effectRef>
-          <a:fontRef idx="minor">
-            <a:schemeClr val="tx1"/>
-          </a:fontRef>
-        </p:style>
-      </p:cxnSp>
-      <p:cxnSp>
-        <p:nvCxnSpPr>
-          <p:cNvPr id="5" name="Straight Arrow Connector 4">
-            <a:extLst>
-              <a:ext uri="{FF2B5EF4-FFF2-40B4-BE49-F238E27FC236}">
-                <a16:creationId xmlns:a16="http://schemas.microsoft.com/office/drawing/2014/main" id="{9E19C684-CBBB-534C-87DC-F217C1372B74}"/>
-              </a:ext>
-            </a:extLst>
-          </p:cNvPr>
-          <p:cNvCxnSpPr>
-            <a:cxnSpLocks/>
-          </p:cNvCxnSpPr>
-          <p:nvPr/>
-        </p:nvCxnSpPr>
-        <p:spPr>
-          <a:xfrm>
-            <a:off x="1738807" y="237947"/>
-            <a:ext cx="1111554" cy="2054872"/>
-          </a:xfrm>
-          <a:prstGeom prst="straightConnector1">
-            <a:avLst/>
-          </a:prstGeom>
-          <a:ln w="38100">
-            <a:tailEnd type="triangle"/>
-          </a:ln>
-        </p:spPr>
-        <p:style>
-          <a:lnRef idx="1">
-            <a:schemeClr val="accent1"/>
-          </a:lnRef>
-          <a:fillRef idx="0">
-            <a:schemeClr val="accent1"/>
-          </a:fillRef>
-          <a:effectRef idx="0">
-            <a:schemeClr val="accent1"/>
-          </a:effectRef>
-          <a:fontRef idx="minor">
-            <a:schemeClr val="tx1"/>
-          </a:fontRef>
-        </p:style>
-      </p:cxnSp>
-      <p:cxnSp>
-        <p:nvCxnSpPr>
-          <p:cNvPr id="6" name="Straight Arrow Connector 5">
-            <a:extLst>
-              <a:ext uri="{FF2B5EF4-FFF2-40B4-BE49-F238E27FC236}">
-                <a16:creationId xmlns:a16="http://schemas.microsoft.com/office/drawing/2014/main" id="{B6E9B559-7015-8D45-B6A4-A0CDD4495811}"/>
-              </a:ext>
-            </a:extLst>
-          </p:cNvPr>
-          <p:cNvCxnSpPr>
-            <a:cxnSpLocks/>
-          </p:cNvCxnSpPr>
-          <p:nvPr/>
-        </p:nvCxnSpPr>
-        <p:spPr>
-          <a:xfrm>
-            <a:off x="2843224" y="237947"/>
-            <a:ext cx="1111554" cy="2054872"/>
-          </a:xfrm>
-          <a:prstGeom prst="straightConnector1">
-            <a:avLst/>
-          </a:prstGeom>
-          <a:ln w="38100">
-            <a:tailEnd type="triangle"/>
-          </a:ln>
-        </p:spPr>
-        <p:style>
-          <a:lnRef idx="1">
-            <a:schemeClr val="accent1"/>
-          </a:lnRef>
-          <a:fillRef idx="0">
-            <a:schemeClr val="accent1"/>
-          </a:fillRef>
-          <a:effectRef idx="0">
-            <a:schemeClr val="accent1"/>
-          </a:effectRef>
-          <a:fontRef idx="minor">
-            <a:schemeClr val="tx1"/>
-          </a:fontRef>
-        </p:style>
-      </p:cxnSp>
-      <p:cxnSp>
-        <p:nvCxnSpPr>
-          <p:cNvPr id="7" name="Straight Arrow Connector 6">
-            <a:extLst>
-              <a:ext uri="{FF2B5EF4-FFF2-40B4-BE49-F238E27FC236}">
-                <a16:creationId xmlns:a16="http://schemas.microsoft.com/office/drawing/2014/main" id="{730639D1-4877-5540-83AF-79EEBA263CC6}"/>
-              </a:ext>
-            </a:extLst>
-          </p:cNvPr>
-          <p:cNvCxnSpPr>
-            <a:cxnSpLocks/>
-          </p:cNvCxnSpPr>
-          <p:nvPr/>
-        </p:nvCxnSpPr>
-        <p:spPr>
-          <a:xfrm>
-            <a:off x="3954778" y="237947"/>
-            <a:ext cx="1111554" cy="2054872"/>
-          </a:xfrm>
-          <a:prstGeom prst="straightConnector1">
-            <a:avLst/>
-          </a:prstGeom>
-          <a:ln w="38100">
-            <a:tailEnd type="triangle"/>
-          </a:ln>
-        </p:spPr>
-        <p:style>
-          <a:lnRef idx="1">
-            <a:schemeClr val="accent1"/>
-          </a:lnRef>
-          <a:fillRef idx="0">
-            <a:schemeClr val="accent1"/>
-          </a:fillRef>
-          <a:effectRef idx="0">
-            <a:schemeClr val="accent1"/>
-          </a:effectRef>
-          <a:fontRef idx="minor">
-            <a:schemeClr val="tx1"/>
-          </a:fontRef>
-        </p:style>
-      </p:cxnSp>
-      <p:sp>
-        <p:nvSpPr>
-          <p:cNvPr id="8" name="TextBox 7">
-            <a:extLst>
-              <a:ext uri="{FF2B5EF4-FFF2-40B4-BE49-F238E27FC236}">
-                <a16:creationId xmlns:a16="http://schemas.microsoft.com/office/drawing/2014/main" id="{2060DB0C-C96A-C145-B6B9-84DD8333E380}"/>
-              </a:ext>
-            </a:extLst>
-          </p:cNvPr>
-          <p:cNvSpPr txBox="1"/>
-          <p:nvPr/>
-        </p:nvSpPr>
-        <p:spPr>
-          <a:xfrm rot="3741770">
-            <a:off x="2425570" y="1080717"/>
-            <a:ext cx="2337816" cy="369332"/>
-          </a:xfrm>
-          <a:prstGeom prst="rect">
-            <a:avLst/>
-          </a:prstGeom>
-          <a:noFill/>
-        </p:spPr>
-        <p:txBody>
-          <a:bodyPr wrap="square" rtlCol="0">
-            <a:spAutoFit/>
-          </a:bodyPr>
-          <a:lstStyle/>
-          <a:p>
-            <a:r>
-              <a:rPr lang="en-US" dirty="0"/>
-              <a:t>Urban &amp; High ED Visits</a:t>
-            </a:r>
-          </a:p>
-        </p:txBody>
-      </p:sp>
-      <p:sp>
-        <p:nvSpPr>
-          <p:cNvPr id="9" name="TextBox 8">
-            <a:extLst>
-              <a:ext uri="{FF2B5EF4-FFF2-40B4-BE49-F238E27FC236}">
-                <a16:creationId xmlns:a16="http://schemas.microsoft.com/office/drawing/2014/main" id="{9D5B7FFB-8BD9-F04C-AEC2-A659580180EF}"/>
-              </a:ext>
-            </a:extLst>
-          </p:cNvPr>
-          <p:cNvSpPr txBox="1"/>
-          <p:nvPr/>
-        </p:nvSpPr>
-        <p:spPr>
-          <a:xfrm rot="3741770">
-            <a:off x="3529985" y="1080720"/>
-            <a:ext cx="2337816" cy="369332"/>
-          </a:xfrm>
-          <a:prstGeom prst="rect">
-            <a:avLst/>
-          </a:prstGeom>
-          <a:noFill/>
-        </p:spPr>
-        <p:txBody>
-          <a:bodyPr wrap="square" rtlCol="0">
-            <a:spAutoFit/>
-          </a:bodyPr>
-          <a:lstStyle/>
-          <a:p>
-            <a:r>
-              <a:rPr lang="en-US" dirty="0"/>
-              <a:t>Urban &amp; Low ED Visits</a:t>
-            </a:r>
-          </a:p>
-        </p:txBody>
-      </p:sp>
-      <p:sp>
-        <p:nvSpPr>
-          <p:cNvPr id="10" name="TextBox 9">
-            <a:extLst>
-              <a:ext uri="{FF2B5EF4-FFF2-40B4-BE49-F238E27FC236}">
-                <a16:creationId xmlns:a16="http://schemas.microsoft.com/office/drawing/2014/main" id="{4B791581-EEE7-3142-BE6A-00F3A9672062}"/>
-              </a:ext>
-            </a:extLst>
-          </p:cNvPr>
-          <p:cNvSpPr txBox="1"/>
-          <p:nvPr/>
-        </p:nvSpPr>
-        <p:spPr>
-          <a:xfrm rot="3741770">
-            <a:off x="1335789" y="1080718"/>
-            <a:ext cx="2337816" cy="369332"/>
-          </a:xfrm>
-          <a:prstGeom prst="rect">
-            <a:avLst/>
-          </a:prstGeom>
-          <a:noFill/>
-        </p:spPr>
-        <p:txBody>
-          <a:bodyPr wrap="square" rtlCol="0">
-            <a:spAutoFit/>
-          </a:bodyPr>
-          <a:lstStyle/>
-          <a:p>
-            <a:r>
-              <a:rPr lang="en-US" dirty="0"/>
-              <a:t>Rural &amp; Low ED Visits</a:t>
-            </a:r>
-          </a:p>
-        </p:txBody>
-      </p:sp>
-      <p:sp>
-        <p:nvSpPr>
-          <p:cNvPr id="11" name="TextBox 10">
-            <a:extLst>
-              <a:ext uri="{FF2B5EF4-FFF2-40B4-BE49-F238E27FC236}">
-                <a16:creationId xmlns:a16="http://schemas.microsoft.com/office/drawing/2014/main" id="{B3B79F7E-AF7B-0A47-AC1B-F180075818A0}"/>
-              </a:ext>
-            </a:extLst>
-          </p:cNvPr>
-          <p:cNvSpPr txBox="1"/>
-          <p:nvPr/>
-        </p:nvSpPr>
-        <p:spPr>
-          <a:xfrm rot="3741770">
-            <a:off x="281656" y="1080718"/>
-            <a:ext cx="2337816" cy="369332"/>
-          </a:xfrm>
-          <a:prstGeom prst="rect">
-            <a:avLst/>
-          </a:prstGeom>
-          <a:noFill/>
-        </p:spPr>
-        <p:txBody>
-          <a:bodyPr wrap="square" rtlCol="0">
-            <a:spAutoFit/>
-          </a:bodyPr>
-          <a:lstStyle/>
-          <a:p>
-            <a:r>
-              <a:rPr lang="en-US" dirty="0"/>
-              <a:t>Rural &amp; High ED Visits</a:t>
-            </a:r>
           </a:p>
         </p:txBody>
       </p:sp>

</xml_diff>